<commit_message>
Before reducing to 50 min.
</commit_message>
<xml_diff>
--- a/Top Things to Learn From Clojure.pptx
+++ b/Top Things to Learn From Clojure.pptx
@@ -4044,24 +4044,20 @@
           <a:lstStyle/>
           <a:p>
             <a:r>
-              <a:rPr lang="en-US" dirty="0" smtClean="0"/>
-              <a:t>Reading into data structure</a:t>
-            </a:r>
-            <a:r>
               <a:rPr lang="en-US" baseline="0" dirty="0" smtClean="0"/>
-              <a:t> (a list)</a:t>
-            </a:r>
-          </a:p>
-          <a:p>
+              <a:t>Shiny new toys: First Rule of Macro Club – don</a:t>
+            </a:r>
+            <a:r>
+              <a:rPr lang="fr-FR" baseline="0" dirty="0" smtClean="0"/>
+              <a:t>’</a:t>
+            </a:r>
             <a:r>
               <a:rPr lang="en-US" baseline="0" dirty="0" smtClean="0"/>
-              <a:t>Applying the macro transformations</a:t>
-            </a:r>
-          </a:p>
-          <a:p>
-            <a:r>
-              <a:rPr lang="en-US" baseline="0" dirty="0" smtClean="0"/>
-              <a:t>Compiling the resulting code</a:t>
+              <a:t>t’ </a:t>
+            </a:r>
+            <a:r>
+              <a:rPr lang="en-US" baseline="0" smtClean="0"/>
+              <a:t>write macros!</a:t>
             </a:r>
           </a:p>
           <a:p>
@@ -6974,6 +6970,38 @@
           </a:p>
         </p:txBody>
       </p:sp>
+      <p:pic>
+        <p:nvPicPr>
+          <p:cNvPr id="7" name="Picture 42" descr="logo_RGB"/>
+          <p:cNvPicPr>
+            <a:picLocks noChangeAspect="1" noChangeArrowheads="1"/>
+          </p:cNvPicPr>
+          <p:nvPr userDrawn="1"/>
+        </p:nvPicPr>
+        <p:blipFill>
+          <a:blip r:embed="rId2"/>
+          <a:srcRect/>
+          <a:stretch>
+            <a:fillRect/>
+          </a:stretch>
+        </p:blipFill>
+        <p:spPr bwMode="auto">
+          <a:xfrm>
+            <a:off x="6858000" y="533400"/>
+            <a:ext cx="1600200" cy="436563"/>
+          </a:xfrm>
+          <a:prstGeom prst="rect">
+            <a:avLst/>
+          </a:prstGeom>
+          <a:noFill/>
+          <a:ln w="9525">
+            <a:noFill/>
+            <a:miter lim="800000"/>
+            <a:headEnd/>
+            <a:tailEnd/>
+          </a:ln>
+        </p:spPr>
+      </p:pic>
     </p:spTree>
   </p:cSld>
   <p:clrMapOvr>
@@ -8688,38 +8716,6 @@
           <a:xfrm>
             <a:off x="0" y="6492875"/>
             <a:ext cx="9144000" cy="365125"/>
-          </a:xfrm>
-          <a:prstGeom prst="rect">
-            <a:avLst/>
-          </a:prstGeom>
-          <a:noFill/>
-          <a:ln w="9525">
-            <a:noFill/>
-            <a:miter lim="800000"/>
-            <a:headEnd/>
-            <a:tailEnd/>
-          </a:ln>
-        </p:spPr>
-      </p:pic>
-      <p:pic>
-        <p:nvPicPr>
-          <p:cNvPr id="1029" name="Picture 42" descr="logo_RGB"/>
-          <p:cNvPicPr>
-            <a:picLocks noChangeAspect="1" noChangeArrowheads="1"/>
-          </p:cNvPicPr>
-          <p:nvPr/>
-        </p:nvPicPr>
-        <p:blipFill>
-          <a:blip r:embed="rId14"/>
-          <a:srcRect/>
-          <a:stretch>
-            <a:fillRect/>
-          </a:stretch>
-        </p:blipFill>
-        <p:spPr bwMode="auto">
-          <a:xfrm>
-            <a:off x="6858000" y="533400"/>
-            <a:ext cx="1600200" cy="436563"/>
           </a:xfrm>
           <a:prstGeom prst="rect">
             <a:avLst/>
@@ -9802,12 +9798,12 @@
   <p:clrMapOvr>
     <a:masterClrMapping/>
   </p:clrMapOvr>
-  <mc:AlternateContent xmlns:mc="http://schemas.openxmlformats.org/markup-compatibility/2006" xmlns:p14="http://schemas.microsoft.com/office/powerpoint/2010/main">
-    <mc:Choice Requires="p14">
-      <p:transition spd="slow" p14:dur="2000" advTm="97496"/>
+  <mc:AlternateContent xmlns:mc="http://schemas.openxmlformats.org/markup-compatibility/2006">
+    <mc:Choice xmlns:p14="http://schemas.microsoft.com/office/powerpoint/2010/main" Requires="p14">
+      <p:transition spd="slow" p14:dur="2000" advTm="95946"/>
     </mc:Choice>
-    <mc:Fallback xmlns="">
-      <p:transition xmlns:p14="http://schemas.microsoft.com/office/powerpoint/2010/main" spd="slow" advTm="97496"/>
+    <mc:Fallback>
+      <p:transition xmlns:p14="http://schemas.microsoft.com/office/powerpoint/2010/main" spd="slow" advTm="95946"/>
     </mc:Fallback>
   </mc:AlternateContent>
   <p:timing>
@@ -10622,12 +10618,12 @@
   <p:clrMapOvr>
     <a:masterClrMapping/>
   </p:clrMapOvr>
-  <mc:AlternateContent xmlns:mc="http://schemas.openxmlformats.org/markup-compatibility/2006" xmlns:p14="http://schemas.microsoft.com/office/powerpoint/2010/main">
-    <mc:Choice Requires="p14">
-      <p:transition spd="slow" p14:dur="2000" advTm="89877"/>
+  <mc:AlternateContent xmlns:mc="http://schemas.openxmlformats.org/markup-compatibility/2006">
+    <mc:Choice xmlns:p14="http://schemas.microsoft.com/office/powerpoint/2010/main" Requires="p14">
+      <p:transition spd="slow" p14:dur="2000" advTm="89604"/>
     </mc:Choice>
-    <mc:Fallback xmlns="">
-      <p:transition xmlns:p14="http://schemas.microsoft.com/office/powerpoint/2010/main" spd="slow" advTm="89877"/>
+    <mc:Fallback>
+      <p:transition xmlns:p14="http://schemas.microsoft.com/office/powerpoint/2010/main" spd="slow" advTm="89604"/>
     </mc:Fallback>
   </mc:AlternateContent>
   <p:timing>
@@ -10839,12 +10835,12 @@
   <p:clrMapOvr>
     <a:masterClrMapping/>
   </p:clrMapOvr>
-  <mc:AlternateContent xmlns:mc="http://schemas.openxmlformats.org/markup-compatibility/2006" xmlns:p14="http://schemas.microsoft.com/office/powerpoint/2010/main">
-    <mc:Choice Requires="p14">
-      <p:transition spd="slow" p14:dur="2000" advTm="100550"/>
+  <mc:AlternateContent xmlns:mc="http://schemas.openxmlformats.org/markup-compatibility/2006">
+    <mc:Choice xmlns:p14="http://schemas.microsoft.com/office/powerpoint/2010/main" Requires="p14">
+      <p:transition spd="slow" p14:dur="2000" advTm="68882"/>
     </mc:Choice>
-    <mc:Fallback xmlns="">
-      <p:transition xmlns:p14="http://schemas.microsoft.com/office/powerpoint/2010/main" spd="slow" advTm="100550"/>
+    <mc:Fallback>
+      <p:transition xmlns:p14="http://schemas.microsoft.com/office/powerpoint/2010/main" spd="slow" advTm="68882"/>
     </mc:Fallback>
   </mc:AlternateContent>
   <p:timing>
@@ -11033,12 +11029,12 @@
   <p:clrMapOvr>
     <a:masterClrMapping/>
   </p:clrMapOvr>
-  <mc:AlternateContent xmlns:mc="http://schemas.openxmlformats.org/markup-compatibility/2006" xmlns:p14="http://schemas.microsoft.com/office/powerpoint/2010/main">
-    <mc:Choice Requires="p14">
-      <p:transition spd="slow" p14:dur="2000" advTm="63869"/>
+  <mc:AlternateContent xmlns:mc="http://schemas.openxmlformats.org/markup-compatibility/2006">
+    <mc:Choice xmlns:p14="http://schemas.microsoft.com/office/powerpoint/2010/main" Requires="p14">
+      <p:transition spd="slow" p14:dur="2000" advTm="109995"/>
     </mc:Choice>
-    <mc:Fallback xmlns="">
-      <p:transition xmlns:p14="http://schemas.microsoft.com/office/powerpoint/2010/main" spd="slow" advTm="63869"/>
+    <mc:Fallback>
+      <p:transition xmlns:p14="http://schemas.microsoft.com/office/powerpoint/2010/main" spd="slow" advTm="109995"/>
     </mc:Fallback>
   </mc:AlternateContent>
   <p:timing>
@@ -11776,12 +11772,12 @@
   <p:clrMapOvr>
     <a:masterClrMapping/>
   </p:clrMapOvr>
-  <mc:AlternateContent xmlns:mc="http://schemas.openxmlformats.org/markup-compatibility/2006" xmlns:p14="http://schemas.microsoft.com/office/powerpoint/2010/main">
-    <mc:Choice Requires="p14">
-      <p:transition spd="slow" p14:dur="2000" advTm="109505"/>
+  <mc:AlternateContent xmlns:mc="http://schemas.openxmlformats.org/markup-compatibility/2006">
+    <mc:Choice xmlns:p14="http://schemas.microsoft.com/office/powerpoint/2010/main" Requires="p14">
+      <p:transition spd="slow" p14:dur="2000" advTm="40126"/>
     </mc:Choice>
-    <mc:Fallback xmlns="">
-      <p:transition xmlns:p14="http://schemas.microsoft.com/office/powerpoint/2010/main" spd="slow" advTm="109505"/>
+    <mc:Fallback>
+      <p:transition xmlns:p14="http://schemas.microsoft.com/office/powerpoint/2010/main" spd="slow" advTm="40126"/>
     </mc:Fallback>
   </mc:AlternateContent>
   <p:timing>
@@ -12687,12 +12683,12 @@
   <p:clrMapOvr>
     <a:masterClrMapping/>
   </p:clrMapOvr>
-  <mc:AlternateContent xmlns:mc="http://schemas.openxmlformats.org/markup-compatibility/2006" xmlns:p14="http://schemas.microsoft.com/office/powerpoint/2010/main">
-    <mc:Choice Requires="p14">
-      <p:transition spd="slow" p14:dur="2000" advTm="109505"/>
+  <mc:AlternateContent xmlns:mc="http://schemas.openxmlformats.org/markup-compatibility/2006">
+    <mc:Choice xmlns:p14="http://schemas.microsoft.com/office/powerpoint/2010/main" Requires="p14">
+      <p:transition spd="slow" p14:dur="2000" advTm="29786"/>
     </mc:Choice>
-    <mc:Fallback xmlns="">
-      <p:transition xmlns:p14="http://schemas.microsoft.com/office/powerpoint/2010/main" spd="slow" advTm="109505"/>
+    <mc:Fallback>
+      <p:transition xmlns:p14="http://schemas.microsoft.com/office/powerpoint/2010/main" spd="slow" advTm="29786"/>
     </mc:Fallback>
   </mc:AlternateContent>
   <p:timing>
@@ -14465,12 +14461,12 @@
   <p:clrMapOvr>
     <a:masterClrMapping/>
   </p:clrMapOvr>
-  <mc:AlternateContent xmlns:mc="http://schemas.openxmlformats.org/markup-compatibility/2006" xmlns:p14="http://schemas.microsoft.com/office/powerpoint/2010/main">
-    <mc:Choice Requires="p14">
-      <p:transition spd="slow" p14:dur="2000" advTm="159123"/>
+  <mc:AlternateContent xmlns:mc="http://schemas.openxmlformats.org/markup-compatibility/2006">
+    <mc:Choice xmlns:p14="http://schemas.microsoft.com/office/powerpoint/2010/main" Requires="p14">
+      <p:transition spd="slow" p14:dur="2000" advTm="138715"/>
     </mc:Choice>
-    <mc:Fallback xmlns="">
-      <p:transition xmlns:p14="http://schemas.microsoft.com/office/powerpoint/2010/main" spd="slow" advTm="159123"/>
+    <mc:Fallback>
+      <p:transition xmlns:p14="http://schemas.microsoft.com/office/powerpoint/2010/main" spd="slow" advTm="138715"/>
     </mc:Fallback>
   </mc:AlternateContent>
   <p:timing>
@@ -17492,12 +17488,12 @@
   <p:clrMapOvr>
     <a:masterClrMapping/>
   </p:clrMapOvr>
-  <mc:AlternateContent xmlns:mc="http://schemas.openxmlformats.org/markup-compatibility/2006" xmlns:p14="http://schemas.microsoft.com/office/powerpoint/2010/main">
-    <mc:Choice Requires="p14">
-      <p:transition spd="slow" p14:dur="2000" advTm="158103"/>
+  <mc:AlternateContent xmlns:mc="http://schemas.openxmlformats.org/markup-compatibility/2006">
+    <mc:Choice xmlns:p14="http://schemas.microsoft.com/office/powerpoint/2010/main" Requires="p14">
+      <p:transition spd="slow" p14:dur="2000" advTm="178467"/>
     </mc:Choice>
-    <mc:Fallback xmlns="">
-      <p:transition xmlns:p14="http://schemas.microsoft.com/office/powerpoint/2010/main" spd="slow" advTm="158103"/>
+    <mc:Fallback>
+      <p:transition xmlns:p14="http://schemas.microsoft.com/office/powerpoint/2010/main" spd="slow" advTm="178467"/>
     </mc:Fallback>
   </mc:AlternateContent>
   <p:timing>
@@ -17583,12 +17579,12 @@
   <p:clrMapOvr>
     <a:masterClrMapping/>
   </p:clrMapOvr>
-  <mc:AlternateContent xmlns:mc="http://schemas.openxmlformats.org/markup-compatibility/2006" xmlns:p14="http://schemas.microsoft.com/office/powerpoint/2010/main">
-    <mc:Choice Requires="p14">
-      <p:transition spd="slow" p14:dur="2000" advTm="5395"/>
+  <mc:AlternateContent xmlns:mc="http://schemas.openxmlformats.org/markup-compatibility/2006">
+    <mc:Choice xmlns:p14="http://schemas.microsoft.com/office/powerpoint/2010/main" Requires="p14">
+      <p:transition spd="slow" p14:dur="2000" advTm="20273"/>
     </mc:Choice>
-    <mc:Fallback xmlns="">
-      <p:transition xmlns:p14="http://schemas.microsoft.com/office/powerpoint/2010/main" spd="slow" advTm="5395"/>
+    <mc:Fallback>
+      <p:transition xmlns:p14="http://schemas.microsoft.com/office/powerpoint/2010/main" spd="slow" advTm="20273"/>
     </mc:Fallback>
   </mc:AlternateContent>
   <p:timing>
@@ -18496,12 +18492,12 @@
   <p:clrMapOvr>
     <a:masterClrMapping/>
   </p:clrMapOvr>
-  <mc:AlternateContent xmlns:mc="http://schemas.openxmlformats.org/markup-compatibility/2006" xmlns:p14="http://schemas.microsoft.com/office/powerpoint/2010/main">
-    <mc:Choice Requires="p14">
-      <p:transition spd="slow" p14:dur="2000" advTm="66744"/>
+  <mc:AlternateContent xmlns:mc="http://schemas.openxmlformats.org/markup-compatibility/2006">
+    <mc:Choice xmlns:p14="http://schemas.microsoft.com/office/powerpoint/2010/main" Requires="p14">
+      <p:transition spd="slow" p14:dur="2000" advTm="92747"/>
     </mc:Choice>
-    <mc:Fallback xmlns="">
-      <p:transition xmlns:p14="http://schemas.microsoft.com/office/powerpoint/2010/main" spd="slow" advTm="66744"/>
+    <mc:Fallback>
+      <p:transition xmlns:p14="http://schemas.microsoft.com/office/powerpoint/2010/main" spd="slow" advTm="92747"/>
     </mc:Fallback>
   </mc:AlternateContent>
   <p:timing>
@@ -20077,12 +20073,12 @@
   <p:clrMapOvr>
     <a:masterClrMapping/>
   </p:clrMapOvr>
-  <mc:AlternateContent xmlns:mc="http://schemas.openxmlformats.org/markup-compatibility/2006" xmlns:p14="http://schemas.microsoft.com/office/powerpoint/2010/main">
-    <mc:Choice Requires="p14">
-      <p:transition spd="slow" p14:dur="2000" advTm="124477"/>
+  <mc:AlternateContent xmlns:mc="http://schemas.openxmlformats.org/markup-compatibility/2006">
+    <mc:Choice xmlns:p14="http://schemas.microsoft.com/office/powerpoint/2010/main" Requires="p14">
+      <p:transition spd="slow" p14:dur="2000" advTm="85984"/>
     </mc:Choice>
-    <mc:Fallback xmlns="">
-      <p:transition xmlns:p14="http://schemas.microsoft.com/office/powerpoint/2010/main" spd="slow" advTm="124477"/>
+    <mc:Fallback>
+      <p:transition xmlns:p14="http://schemas.microsoft.com/office/powerpoint/2010/main" spd="slow" advTm="85984"/>
     </mc:Fallback>
   </mc:AlternateContent>
   <p:timing>
@@ -20199,14 +20195,14 @@
   <p:clrMapOvr>
     <a:masterClrMapping/>
   </p:clrMapOvr>
-  <mc:AlternateContent xmlns:mc="http://schemas.openxmlformats.org/markup-compatibility/2006" xmlns:p14="http://schemas.microsoft.com/office/powerpoint/2010/main">
-    <mc:Choice Requires="p14">
-      <p:transition spd="slow" p14:dur="3400" advTm="208153">
+  <mc:AlternateContent xmlns:mc="http://schemas.openxmlformats.org/markup-compatibility/2006">
+    <mc:Choice xmlns:p14="http://schemas.microsoft.com/office/powerpoint/2010/main" Requires="p14">
+      <p:transition spd="slow" p14:dur="3400" advTm="105549">
         <p14:reveal/>
       </p:transition>
     </mc:Choice>
-    <mc:Fallback xmlns="">
-      <p:transition xmlns:p14="http://schemas.microsoft.com/office/powerpoint/2010/main" spd="slow" advTm="208153">
+    <mc:Fallback>
+      <p:transition xmlns:p14="http://schemas.microsoft.com/office/powerpoint/2010/main" spd="slow" advTm="105549">
         <p:fade/>
       </p:transition>
     </mc:Fallback>
@@ -21374,12 +21370,12 @@
   <p:clrMapOvr>
     <a:masterClrMapping/>
   </p:clrMapOvr>
-  <mc:AlternateContent xmlns:mc="http://schemas.openxmlformats.org/markup-compatibility/2006" xmlns:p14="http://schemas.microsoft.com/office/powerpoint/2010/main">
-    <mc:Choice Requires="p14">
-      <p:transition spd="slow" p14:dur="2000" advTm="124477"/>
+  <mc:AlternateContent xmlns:mc="http://schemas.openxmlformats.org/markup-compatibility/2006">
+    <mc:Choice xmlns:p14="http://schemas.microsoft.com/office/powerpoint/2010/main" Requires="p14">
+      <p:transition spd="slow" p14:dur="2000" advTm="2413"/>
     </mc:Choice>
-    <mc:Fallback xmlns="">
-      <p:transition xmlns:p14="http://schemas.microsoft.com/office/powerpoint/2010/main" spd="slow" advTm="124477"/>
+    <mc:Fallback>
+      <p:transition xmlns:p14="http://schemas.microsoft.com/office/powerpoint/2010/main" spd="slow" advTm="2413"/>
     </mc:Fallback>
   </mc:AlternateContent>
   <p:timing>
@@ -22794,12 +22790,12 @@
   <p:clrMapOvr>
     <a:masterClrMapping/>
   </p:clrMapOvr>
-  <mc:AlternateContent xmlns:mc="http://schemas.openxmlformats.org/markup-compatibility/2006" xmlns:p14="http://schemas.microsoft.com/office/powerpoint/2010/main">
-    <mc:Choice Requires="p14">
-      <p:transition spd="slow" p14:dur="2000" advTm="61841"/>
+  <mc:AlternateContent xmlns:mc="http://schemas.openxmlformats.org/markup-compatibility/2006">
+    <mc:Choice xmlns:p14="http://schemas.microsoft.com/office/powerpoint/2010/main" Requires="p14">
+      <p:transition spd="slow" p14:dur="2000" advTm="132427"/>
     </mc:Choice>
-    <mc:Fallback xmlns="">
-      <p:transition xmlns:p14="http://schemas.microsoft.com/office/powerpoint/2010/main" spd="slow" advTm="61841"/>
+    <mc:Fallback>
+      <p:transition xmlns:p14="http://schemas.microsoft.com/office/powerpoint/2010/main" spd="slow" advTm="132427"/>
     </mc:Fallback>
   </mc:AlternateContent>
   <p:timing>
@@ -24242,12 +24238,12 @@
   <p:clrMapOvr>
     <a:masterClrMapping/>
   </p:clrMapOvr>
-  <mc:AlternateContent xmlns:mc="http://schemas.openxmlformats.org/markup-compatibility/2006" xmlns:p14="http://schemas.microsoft.com/office/powerpoint/2010/main">
-    <mc:Choice Requires="p14">
-      <p:transition spd="slow" p14:dur="2000" advTm="233662"/>
+  <mc:AlternateContent xmlns:mc="http://schemas.openxmlformats.org/markup-compatibility/2006">
+    <mc:Choice xmlns:p14="http://schemas.microsoft.com/office/powerpoint/2010/main" Requires="p14">
+      <p:transition spd="slow" p14:dur="2000" advTm="188362"/>
     </mc:Choice>
-    <mc:Fallback xmlns="">
-      <p:transition xmlns:p14="http://schemas.microsoft.com/office/powerpoint/2010/main" spd="slow" advTm="233662"/>
+    <mc:Fallback>
+      <p:transition xmlns:p14="http://schemas.microsoft.com/office/powerpoint/2010/main" spd="slow" advTm="188362"/>
     </mc:Fallback>
   </mc:AlternateContent>
   <p:timing>
@@ -26933,12 +26929,12 @@
   <p:clrMapOvr>
     <a:masterClrMapping/>
   </p:clrMapOvr>
-  <mc:AlternateContent xmlns:mc="http://schemas.openxmlformats.org/markup-compatibility/2006" xmlns:p14="http://schemas.microsoft.com/office/powerpoint/2010/main">
-    <mc:Choice Requires="p14">
-      <p:transition spd="slow" p14:dur="2000" advTm="116578"/>
+  <mc:AlternateContent xmlns:mc="http://schemas.openxmlformats.org/markup-compatibility/2006">
+    <mc:Choice xmlns:p14="http://schemas.microsoft.com/office/powerpoint/2010/main" Requires="p14">
+      <p:transition spd="slow" p14:dur="2000" advTm="93039"/>
     </mc:Choice>
-    <mc:Fallback xmlns="">
-      <p:transition xmlns:p14="http://schemas.microsoft.com/office/powerpoint/2010/main" spd="slow" advTm="116578"/>
+    <mc:Fallback>
+      <p:transition xmlns:p14="http://schemas.microsoft.com/office/powerpoint/2010/main" spd="slow" advTm="93039"/>
     </mc:Fallback>
   </mc:AlternateContent>
   <p:timing>
@@ -27718,12 +27714,12 @@
   <p:clrMapOvr>
     <a:masterClrMapping/>
   </p:clrMapOvr>
-  <mc:AlternateContent xmlns:mc="http://schemas.openxmlformats.org/markup-compatibility/2006" xmlns:p14="http://schemas.microsoft.com/office/powerpoint/2010/main">
-    <mc:Choice Requires="p14">
-      <p:transition spd="slow" p14:dur="2000" advTm="64861"/>
+  <mc:AlternateContent xmlns:mc="http://schemas.openxmlformats.org/markup-compatibility/2006">
+    <mc:Choice xmlns:p14="http://schemas.microsoft.com/office/powerpoint/2010/main" Requires="p14">
+      <p:transition spd="slow" p14:dur="2000" advTm="86823"/>
     </mc:Choice>
-    <mc:Fallback xmlns="">
-      <p:transition xmlns:p14="http://schemas.microsoft.com/office/powerpoint/2010/main" spd="slow" advTm="64862"/>
+    <mc:Fallback>
+      <p:transition xmlns:p14="http://schemas.microsoft.com/office/powerpoint/2010/main" spd="slow" advTm="86823"/>
     </mc:Fallback>
   </mc:AlternateContent>
   <p:timing>
@@ -27805,12 +27801,12 @@
   <p:clrMapOvr>
     <a:masterClrMapping/>
   </p:clrMapOvr>
-  <mc:AlternateContent xmlns:mc="http://schemas.openxmlformats.org/markup-compatibility/2006" xmlns:p14="http://schemas.microsoft.com/office/powerpoint/2010/main">
-    <mc:Choice Requires="p14">
-      <p:transition spd="slow" p14:dur="2000" advTm="10310"/>
+  <mc:AlternateContent xmlns:mc="http://schemas.openxmlformats.org/markup-compatibility/2006">
+    <mc:Choice xmlns:p14="http://schemas.microsoft.com/office/powerpoint/2010/main" Requires="p14">
+      <p:transition spd="slow" p14:dur="2000" advTm="5745"/>
     </mc:Choice>
-    <mc:Fallback xmlns="">
-      <p:transition xmlns:p14="http://schemas.microsoft.com/office/powerpoint/2010/main" spd="slow" advTm="10310"/>
+    <mc:Fallback>
+      <p:transition xmlns:p14="http://schemas.microsoft.com/office/powerpoint/2010/main" spd="slow" advTm="5745"/>
     </mc:Fallback>
   </mc:AlternateContent>
   <p:timing>
@@ -29260,12 +29256,12 @@
   <p:clrMapOvr>
     <a:masterClrMapping/>
   </p:clrMapOvr>
-  <mc:AlternateContent xmlns:mc="http://schemas.openxmlformats.org/markup-compatibility/2006" xmlns:p14="http://schemas.microsoft.com/office/powerpoint/2010/main">
-    <mc:Choice Requires="p14">
-      <p:transition spd="slow" p14:dur="2000" advTm="250729"/>
+  <mc:AlternateContent xmlns:mc="http://schemas.openxmlformats.org/markup-compatibility/2006">
+    <mc:Choice xmlns:p14="http://schemas.microsoft.com/office/powerpoint/2010/main" Requires="p14">
+      <p:transition spd="slow" p14:dur="2000" advTm="105138"/>
     </mc:Choice>
-    <mc:Fallback xmlns="">
-      <p:transition xmlns:p14="http://schemas.microsoft.com/office/powerpoint/2010/main" spd="slow" advTm="250729"/>
+    <mc:Fallback>
+      <p:transition xmlns:p14="http://schemas.microsoft.com/office/powerpoint/2010/main" spd="slow" advTm="105138"/>
     </mc:Fallback>
   </mc:AlternateContent>
   <p:timing>
@@ -29346,12 +29342,12 @@
   <p:clrMapOvr>
     <a:masterClrMapping/>
   </p:clrMapOvr>
-  <mc:AlternateContent xmlns:mc="http://schemas.openxmlformats.org/markup-compatibility/2006" xmlns:p14="http://schemas.microsoft.com/office/powerpoint/2010/main">
-    <mc:Choice Requires="p14">
-      <p:transition spd="slow" p14:dur="2000" advTm="11730"/>
+  <mc:AlternateContent xmlns:mc="http://schemas.openxmlformats.org/markup-compatibility/2006">
+    <mc:Choice xmlns:p14="http://schemas.microsoft.com/office/powerpoint/2010/main" Requires="p14">
+      <p:transition spd="slow" p14:dur="2000" advTm="2453"/>
     </mc:Choice>
-    <mc:Fallback xmlns="">
-      <p:transition xmlns:p14="http://schemas.microsoft.com/office/powerpoint/2010/main" spd="slow" advTm="11730"/>
+    <mc:Fallback>
+      <p:transition xmlns:p14="http://schemas.microsoft.com/office/powerpoint/2010/main" spd="slow" advTm="2453"/>
     </mc:Fallback>
   </mc:AlternateContent>
   <p:timing>
@@ -29941,21 +29937,7 @@
                 <a:latin typeface="Consolas"/>
                 <a:cs typeface="Consolas"/>
               </a:rPr>
-              <a:t> </a:t>
-            </a:r>
-            <a:r>
-              <a:rPr lang="en-US" sz="1200" dirty="0" smtClean="0">
-                <a:latin typeface="Consolas"/>
-                <a:cs typeface="Consolas"/>
-              </a:rPr>
-              <a:t>1.45</a:t>
-            </a:r>
-            <a:r>
-              <a:rPr lang="en-US" sz="1200" dirty="0" smtClean="0">
-                <a:latin typeface="Consolas"/>
-                <a:cs typeface="Consolas"/>
-              </a:rPr>
-              <a:t>) </a:t>
+              <a:t> 1.45) </a:t>
             </a:r>
           </a:p>
           <a:p>
@@ -30012,11 +29994,6 @@
               </a:rPr>
               <a:t>1.46)</a:t>
             </a:r>
-            <a:endParaRPr lang="en-US" sz="1200" dirty="0" smtClean="0">
-              <a:latin typeface="Consolas"/>
-              <a:cs typeface="Consolas"/>
-              <a:sym typeface="Wingdings"/>
-            </a:endParaRPr>
           </a:p>
           <a:p>
             <a:pPr marL="0" indent="0">
@@ -30478,12 +30455,12 @@
   <p:clrMapOvr>
     <a:masterClrMapping/>
   </p:clrMapOvr>
-  <mc:AlternateContent xmlns:mc="http://schemas.openxmlformats.org/markup-compatibility/2006" xmlns:p14="http://schemas.microsoft.com/office/powerpoint/2010/main">
-    <mc:Choice Requires="p14">
-      <p:transition spd="slow" p14:dur="2000" advTm="67399"/>
+  <mc:AlternateContent xmlns:mc="http://schemas.openxmlformats.org/markup-compatibility/2006">
+    <mc:Choice xmlns:p14="http://schemas.microsoft.com/office/powerpoint/2010/main" Requires="p14">
+      <p:transition spd="slow" p14:dur="2000" advTm="466"/>
     </mc:Choice>
-    <mc:Fallback xmlns="">
-      <p:transition xmlns:p14="http://schemas.microsoft.com/office/powerpoint/2010/main" spd="slow" advTm="67399"/>
+    <mc:Fallback>
+      <p:transition xmlns:p14="http://schemas.microsoft.com/office/powerpoint/2010/main" spd="slow" advTm="466"/>
     </mc:Fallback>
   </mc:AlternateContent>
   <p:timing>
@@ -31809,12 +31786,12 @@
   <p:clrMapOvr>
     <a:masterClrMapping/>
   </p:clrMapOvr>
-  <mc:AlternateContent xmlns:mc="http://schemas.openxmlformats.org/markup-compatibility/2006" xmlns:p14="http://schemas.microsoft.com/office/powerpoint/2010/main">
-    <mc:Choice Requires="p14">
-      <p:transition spd="slow" p14:dur="2000" advTm="78266"/>
+  <mc:AlternateContent xmlns:mc="http://schemas.openxmlformats.org/markup-compatibility/2006">
+    <mc:Choice xmlns:p14="http://schemas.microsoft.com/office/powerpoint/2010/main" Requires="p14">
+      <p:transition spd="slow" p14:dur="2000" advTm="797"/>
     </mc:Choice>
-    <mc:Fallback xmlns="">
-      <p:transition xmlns:p14="http://schemas.microsoft.com/office/powerpoint/2010/main" spd="slow" advTm="78266"/>
+    <mc:Fallback>
+      <p:transition xmlns:p14="http://schemas.microsoft.com/office/powerpoint/2010/main" spd="slow" advTm="797"/>
     </mc:Fallback>
   </mc:AlternateContent>
   <p:timing>
@@ -31866,15 +31843,7 @@
           <a:p>
             <a:r>
               <a:rPr lang="en-US" dirty="0" smtClean="0"/>
-              <a:t>Reducing </a:t>
-            </a:r>
-            <a:r>
-              <a:rPr lang="en-US" dirty="0" smtClean="0"/>
-              <a:t>the Complexity </a:t>
-            </a:r>
-            <a:r>
-              <a:rPr lang="en-US" dirty="0" smtClean="0"/>
-              <a:t>of the Implementation Domain</a:t>
+              <a:t>Reducing the Complexity of the Implementation Domain</a:t>
             </a:r>
             <a:endParaRPr lang="en-US" dirty="0"/>
           </a:p>
@@ -32403,12 +32372,12 @@
   <p:clrMapOvr>
     <a:masterClrMapping/>
   </p:clrMapOvr>
-  <mc:AlternateContent xmlns:mc="http://schemas.openxmlformats.org/markup-compatibility/2006" xmlns:p14="http://schemas.microsoft.com/office/powerpoint/2010/main">
-    <mc:Choice Requires="p14">
-      <p:transition spd="slow" p14:dur="2000" advTm="207472"/>
+  <mc:AlternateContent xmlns:mc="http://schemas.openxmlformats.org/markup-compatibility/2006">
+    <mc:Choice xmlns:p14="http://schemas.microsoft.com/office/powerpoint/2010/main" Requires="p14">
+      <p:transition spd="slow" p14:dur="2000" advTm="382711"/>
     </mc:Choice>
-    <mc:Fallback xmlns="">
-      <p:transition xmlns:p14="http://schemas.microsoft.com/office/powerpoint/2010/main" spd="slow" advTm="207472"/>
+    <mc:Fallback>
+      <p:transition xmlns:p14="http://schemas.microsoft.com/office/powerpoint/2010/main" spd="slow" advTm="382711"/>
     </mc:Fallback>
   </mc:AlternateContent>
   <p:timing>
@@ -32647,12 +32616,12 @@
   <p:clrMapOvr>
     <a:masterClrMapping/>
   </p:clrMapOvr>
-  <mc:AlternateContent xmlns:mc="http://schemas.openxmlformats.org/markup-compatibility/2006" xmlns:p14="http://schemas.microsoft.com/office/powerpoint/2010/main">
-    <mc:Choice Requires="p14">
-      <p:transition spd="slow" p14:dur="2000" advTm="54541"/>
+  <mc:AlternateContent xmlns:mc="http://schemas.openxmlformats.org/markup-compatibility/2006">
+    <mc:Choice xmlns:p14="http://schemas.microsoft.com/office/powerpoint/2010/main" Requires="p14">
+      <p:transition spd="slow" p14:dur="2000" advTm="89015"/>
     </mc:Choice>
-    <mc:Fallback xmlns="">
-      <p:transition xmlns:p14="http://schemas.microsoft.com/office/powerpoint/2010/main" spd="slow" advTm="54541"/>
+    <mc:Fallback>
+      <p:transition xmlns:p14="http://schemas.microsoft.com/office/powerpoint/2010/main" spd="slow" advTm="89015"/>
     </mc:Fallback>
   </mc:AlternateContent>
   <p:timing>
@@ -33040,12 +33009,12 @@
   <p:clrMapOvr>
     <a:masterClrMapping/>
   </p:clrMapOvr>
-  <mc:AlternateContent xmlns:mc="http://schemas.openxmlformats.org/markup-compatibility/2006" xmlns:p14="http://schemas.microsoft.com/office/powerpoint/2010/main">
-    <mc:Choice Requires="p14">
-      <p:transition spd="slow" p14:dur="2000" advTm="41582"/>
+  <mc:AlternateContent xmlns:mc="http://schemas.openxmlformats.org/markup-compatibility/2006">
+    <mc:Choice xmlns:p14="http://schemas.microsoft.com/office/powerpoint/2010/main" Requires="p14">
+      <p:transition spd="slow" p14:dur="2000" advTm="30171"/>
     </mc:Choice>
-    <mc:Fallback xmlns="">
-      <p:transition xmlns:p14="http://schemas.microsoft.com/office/powerpoint/2010/main" spd="slow" advTm="41582"/>
+    <mc:Fallback>
+      <p:transition xmlns:p14="http://schemas.microsoft.com/office/powerpoint/2010/main" spd="slow" advTm="30171"/>
     </mc:Fallback>
   </mc:AlternateContent>
   <p:timing>
@@ -33184,12 +33153,12 @@
   <p:clrMapOvr>
     <a:masterClrMapping/>
   </p:clrMapOvr>
-  <mc:AlternateContent xmlns:mc="http://schemas.openxmlformats.org/markup-compatibility/2006" xmlns:p14="http://schemas.microsoft.com/office/powerpoint/2010/main">
-    <mc:Choice Requires="p14">
-      <p:transition spd="slow" p14:dur="2000" advTm="2535"/>
+  <mc:AlternateContent xmlns:mc="http://schemas.openxmlformats.org/markup-compatibility/2006">
+    <mc:Choice xmlns:p14="http://schemas.microsoft.com/office/powerpoint/2010/main" Requires="p14">
+      <p:transition spd="slow" p14:dur="2000" advTm="2967"/>
     </mc:Choice>
-    <mc:Fallback xmlns="">
-      <p:transition xmlns:p14="http://schemas.microsoft.com/office/powerpoint/2010/main" spd="slow" advTm="2535"/>
+    <mc:Fallback>
+      <p:transition xmlns:p14="http://schemas.microsoft.com/office/powerpoint/2010/main" spd="slow" advTm="2967"/>
     </mc:Fallback>
   </mc:AlternateContent>
   <p:timing>
@@ -33379,12 +33348,12 @@
   <p:clrMapOvr>
     <a:masterClrMapping/>
   </p:clrMapOvr>
-  <mc:AlternateContent xmlns:mc="http://schemas.openxmlformats.org/markup-compatibility/2006" xmlns:p14="http://schemas.microsoft.com/office/powerpoint/2010/main">
-    <mc:Choice Requires="p14">
-      <p:transition spd="slow" p14:dur="2000" advTm="5304"/>
+  <mc:AlternateContent xmlns:mc="http://schemas.openxmlformats.org/markup-compatibility/2006">
+    <mc:Choice xmlns:p14="http://schemas.microsoft.com/office/powerpoint/2010/main" Requires="p14">
+      <p:transition spd="slow" p14:dur="2000" advTm="517"/>
     </mc:Choice>
-    <mc:Fallback xmlns="">
-      <p:transition xmlns:p14="http://schemas.microsoft.com/office/powerpoint/2010/main" spd="slow" advTm="5304"/>
+    <mc:Fallback>
+      <p:transition xmlns:p14="http://schemas.microsoft.com/office/powerpoint/2010/main" spd="slow" advTm="517"/>
     </mc:Fallback>
   </mc:AlternateContent>
   <p:timing>
@@ -33561,12 +33530,12 @@
   <p:clrMapOvr>
     <a:masterClrMapping/>
   </p:clrMapOvr>
-  <mc:AlternateContent xmlns:mc="http://schemas.openxmlformats.org/markup-compatibility/2006" xmlns:p14="http://schemas.microsoft.com/office/powerpoint/2010/main">
-    <mc:Choice Requires="p14">
-      <p:transition spd="slow" p14:dur="2000" advTm="1428"/>
+  <mc:AlternateContent xmlns:mc="http://schemas.openxmlformats.org/markup-compatibility/2006">
+    <mc:Choice xmlns:p14="http://schemas.microsoft.com/office/powerpoint/2010/main" Requires="p14">
+      <p:transition spd="slow" p14:dur="2000" advTm="247"/>
     </mc:Choice>
-    <mc:Fallback xmlns="">
-      <p:transition xmlns:p14="http://schemas.microsoft.com/office/powerpoint/2010/main" spd="slow" advTm="1428"/>
+    <mc:Fallback>
+      <p:transition xmlns:p14="http://schemas.microsoft.com/office/powerpoint/2010/main" spd="slow" advTm="247"/>
     </mc:Fallback>
   </mc:AlternateContent>
   <p:timing>
@@ -33648,12 +33617,12 @@
   <p:clrMapOvr>
     <a:masterClrMapping/>
   </p:clrMapOvr>
-  <mc:AlternateContent xmlns:mc="http://schemas.openxmlformats.org/markup-compatibility/2006" xmlns:p14="http://schemas.microsoft.com/office/powerpoint/2010/main">
-    <mc:Choice Requires="p14">
-      <p:transition spd="slow" p14:dur="2000" advTm="13091"/>
+  <mc:AlternateContent xmlns:mc="http://schemas.openxmlformats.org/markup-compatibility/2006">
+    <mc:Choice xmlns:p14="http://schemas.microsoft.com/office/powerpoint/2010/main" Requires="p14">
+      <p:transition spd="slow" p14:dur="2000" advTm="12815"/>
     </mc:Choice>
-    <mc:Fallback xmlns="">
-      <p:transition xmlns:p14="http://schemas.microsoft.com/office/powerpoint/2010/main" spd="slow" advTm="13091"/>
+    <mc:Fallback>
+      <p:transition xmlns:p14="http://schemas.microsoft.com/office/powerpoint/2010/main" spd="slow" advTm="12815"/>
     </mc:Fallback>
   </mc:AlternateContent>
   <p:timing>
@@ -33830,12 +33799,12 @@
   <p:clrMapOvr>
     <a:masterClrMapping/>
   </p:clrMapOvr>
-  <mc:AlternateContent xmlns:mc="http://schemas.openxmlformats.org/markup-compatibility/2006" xmlns:p14="http://schemas.microsoft.com/office/powerpoint/2010/main">
-    <mc:Choice Requires="p14">
-      <p:transition spd="slow" p14:dur="2000" advTm="31409"/>
+  <mc:AlternateContent xmlns:mc="http://schemas.openxmlformats.org/markup-compatibility/2006">
+    <mc:Choice xmlns:p14="http://schemas.microsoft.com/office/powerpoint/2010/main" Requires="p14">
+      <p:transition spd="slow" p14:dur="2000" advTm="55727"/>
     </mc:Choice>
-    <mc:Fallback xmlns="">
-      <p:transition xmlns:p14="http://schemas.microsoft.com/office/powerpoint/2010/main" spd="slow" advTm="31409"/>
+    <mc:Fallback>
+      <p:transition xmlns:p14="http://schemas.microsoft.com/office/powerpoint/2010/main" spd="slow" advTm="55727"/>
     </mc:Fallback>
   </mc:AlternateContent>
   <p:timing>
@@ -34513,12 +34482,12 @@
   <p:clrMapOvr>
     <a:masterClrMapping/>
   </p:clrMapOvr>
-  <mc:AlternateContent xmlns:mc="http://schemas.openxmlformats.org/markup-compatibility/2006" xmlns:p14="http://schemas.microsoft.com/office/powerpoint/2010/main">
-    <mc:Choice Requires="p14">
-      <p:transition spd="slow" p14:dur="2000" advTm="43351"/>
+  <mc:AlternateContent xmlns:mc="http://schemas.openxmlformats.org/markup-compatibility/2006">
+    <mc:Choice xmlns:p14="http://schemas.microsoft.com/office/powerpoint/2010/main" Requires="p14">
+      <p:transition spd="slow" p14:dur="2000" advTm="27698"/>
     </mc:Choice>
-    <mc:Fallback xmlns="">
-      <p:transition xmlns:p14="http://schemas.microsoft.com/office/powerpoint/2010/main" spd="slow" advTm="43351"/>
+    <mc:Fallback>
+      <p:transition xmlns:p14="http://schemas.microsoft.com/office/powerpoint/2010/main" spd="slow" advTm="27698"/>
     </mc:Fallback>
   </mc:AlternateContent>
   <p:timing>
@@ -35409,12 +35378,12 @@
   <p:clrMapOvr>
     <a:masterClrMapping/>
   </p:clrMapOvr>
-  <mc:AlternateContent xmlns:mc="http://schemas.openxmlformats.org/markup-compatibility/2006" xmlns:p14="http://schemas.microsoft.com/office/powerpoint/2010/main">
-    <mc:Choice Requires="p14">
-      <p:transition spd="slow" p14:dur="2000" advTm="81500"/>
+  <mc:AlternateContent xmlns:mc="http://schemas.openxmlformats.org/markup-compatibility/2006">
+    <mc:Choice xmlns:p14="http://schemas.microsoft.com/office/powerpoint/2010/main" Requires="p14">
+      <p:transition spd="slow" p14:dur="2000" advTm="67445"/>
     </mc:Choice>
-    <mc:Fallback xmlns="">
-      <p:transition xmlns:p14="http://schemas.microsoft.com/office/powerpoint/2010/main" spd="slow" advTm="81500"/>
+    <mc:Fallback>
+      <p:transition xmlns:p14="http://schemas.microsoft.com/office/powerpoint/2010/main" spd="slow" advTm="67445"/>
     </mc:Fallback>
   </mc:AlternateContent>
   <p:timing>
@@ -35737,12 +35706,12 @@
   <p:clrMapOvr>
     <a:masterClrMapping/>
   </p:clrMapOvr>
-  <mc:AlternateContent xmlns:mc="http://schemas.openxmlformats.org/markup-compatibility/2006" xmlns:p14="http://schemas.microsoft.com/office/powerpoint/2010/main">
-    <mc:Choice Requires="p14">
-      <p:transition spd="slow" p14:dur="2000" advTm="424"/>
+  <mc:AlternateContent xmlns:mc="http://schemas.openxmlformats.org/markup-compatibility/2006">
+    <mc:Choice xmlns:p14="http://schemas.microsoft.com/office/powerpoint/2010/main" Requires="p14">
+      <p:transition spd="slow" p14:dur="2000" advTm="72523"/>
     </mc:Choice>
-    <mc:Fallback xmlns="">
-      <p:transition xmlns:p14="http://schemas.microsoft.com/office/powerpoint/2010/main" spd="slow" advTm="424"/>
+    <mc:Fallback>
+      <p:transition xmlns:p14="http://schemas.microsoft.com/office/powerpoint/2010/main" spd="slow" advTm="72523"/>
     </mc:Fallback>
   </mc:AlternateContent>
   <p:timing>
@@ -35824,12 +35793,12 @@
   <p:clrMapOvr>
     <a:masterClrMapping/>
   </p:clrMapOvr>
-  <mc:AlternateContent xmlns:mc="http://schemas.openxmlformats.org/markup-compatibility/2006" xmlns:p14="http://schemas.microsoft.com/office/powerpoint/2010/main">
-    <mc:Choice Requires="p14">
-      <p:transition spd="slow" p14:dur="2000" advTm="16975"/>
+  <mc:AlternateContent xmlns:mc="http://schemas.openxmlformats.org/markup-compatibility/2006">
+    <mc:Choice xmlns:p14="http://schemas.microsoft.com/office/powerpoint/2010/main" Requires="p14">
+      <p:transition spd="slow" p14:dur="2000" advTm="14486"/>
     </mc:Choice>
-    <mc:Fallback xmlns="">
-      <p:transition xmlns:p14="http://schemas.microsoft.com/office/powerpoint/2010/main" spd="slow" advTm="16975"/>
+    <mc:Fallback>
+      <p:transition xmlns:p14="http://schemas.microsoft.com/office/powerpoint/2010/main" spd="slow" advTm="14486"/>
     </mc:Fallback>
   </mc:AlternateContent>
   <p:timing>
@@ -36612,115 +36581,7 @@
               </a:rPr>
               <a:t> </a:t>
             </a:r>
-            <a:r>
-              <a:rPr lang="en-US" sz="1600" dirty="0">
-                <a:solidFill>
-                  <a:srgbClr val="3C8203"/>
-                </a:solidFill>
-                <a:latin typeface="Consolas"/>
-              </a:rPr>
-              <a:t>nil</a:t>
-            </a:r>
-            <a:r>
-              <a:rPr lang="en-US" sz="1600" dirty="0">
-                <a:solidFill>
-                  <a:srgbClr val="1C1C14"/>
-                </a:solidFill>
-                <a:latin typeface="Consolas"/>
-              </a:rPr>
-              <a:t> </a:t>
-            </a:r>
-            <a:r>
-              <a:rPr lang="en-US" sz="1600" b="1" dirty="0">
-                <a:solidFill>
-                  <a:srgbClr val="5E1445"/>
-                </a:solidFill>
-                <a:latin typeface="Consolas-Bold"/>
-              </a:rPr>
-              <a:t>(</a:t>
-            </a:r>
-            <a:r>
-              <a:rPr lang="en-US" sz="1600" dirty="0">
-                <a:solidFill>
-                  <a:srgbClr val="515151"/>
-                </a:solidFill>
-                <a:latin typeface="Consolas"/>
-              </a:rPr>
-              <a:t>do</a:t>
-            </a:r>
-            <a:r>
-              <a:rPr lang="en-US" sz="1600" dirty="0">
-                <a:solidFill>
-                  <a:srgbClr val="1C1C14"/>
-                </a:solidFill>
-                <a:latin typeface="Consolas"/>
-              </a:rPr>
-              <a:t> </a:t>
-            </a:r>
-            <a:r>
-              <a:rPr lang="en-US" sz="1600" b="1" dirty="0">
-                <a:solidFill>
-                  <a:srgbClr val="5E1445"/>
-                </a:solidFill>
-                <a:latin typeface="Consolas-Bold"/>
-              </a:rPr>
-              <a:t>(</a:t>
-            </a:r>
-            <a:r>
-              <a:rPr lang="en-US" sz="1600" dirty="0" err="1">
-                <a:solidFill>
-                  <a:srgbClr val="E03186"/>
-                </a:solidFill>
-                <a:latin typeface="Consolas"/>
-              </a:rPr>
-              <a:t>println</a:t>
-            </a:r>
-            <a:r>
-              <a:rPr lang="en-US" sz="1600" dirty="0">
-                <a:solidFill>
-                  <a:srgbClr val="1C1C14"/>
-                </a:solidFill>
-                <a:latin typeface="Consolas"/>
-              </a:rPr>
-              <a:t> </a:t>
-            </a:r>
-            <a:r>
-              <a:rPr lang="en-US" sz="1600" dirty="0">
-                <a:solidFill>
-                  <a:srgbClr val="0029FA"/>
-                </a:solidFill>
-                <a:latin typeface="Consolas"/>
-              </a:rPr>
-              <a:t>"x is non-</a:t>
-            </a:r>
-            <a:r>
-              <a:rPr lang="en-US" sz="1600" dirty="0" err="1">
-                <a:solidFill>
-                  <a:srgbClr val="0029FA"/>
-                </a:solidFill>
-                <a:latin typeface="Consolas"/>
-              </a:rPr>
-              <a:t>neg</a:t>
-            </a:r>
-            <a:r>
-              <a:rPr lang="en-US" sz="1600" dirty="0">
-                <a:solidFill>
-                  <a:srgbClr val="0029FA"/>
-                </a:solidFill>
-                <a:latin typeface="Consolas"/>
-              </a:rPr>
-              <a:t>"</a:t>
-            </a:r>
-            <a:r>
-              <a:rPr lang="en-US" sz="1600" b="1" dirty="0">
-                <a:solidFill>
-                  <a:srgbClr val="5E1445"/>
-                </a:solidFill>
-                <a:latin typeface="Consolas-Bold"/>
-              </a:rPr>
-              <a:t>)))</a:t>
-            </a:r>
-            <a:endParaRPr lang="en-US" sz="1600" dirty="0">
+            <a:endParaRPr lang="en-US" sz="1600" dirty="0" smtClean="0">
               <a:solidFill>
                 <a:srgbClr val="1C1C14"/>
               </a:solidFill>
@@ -36732,25 +36593,172 @@
               <a:buNone/>
             </a:pPr>
             <a:r>
+              <a:rPr lang="en-US" sz="1600" dirty="0">
+                <a:solidFill>
+                  <a:srgbClr val="1C1C14"/>
+                </a:solidFill>
+                <a:latin typeface="Consolas"/>
+              </a:rPr>
+              <a:t> </a:t>
+            </a:r>
+            <a:r>
               <a:rPr lang="en-US" sz="1600" dirty="0" smtClean="0">
                 <a:solidFill>
                   <a:srgbClr val="1C1C14"/>
                 </a:solidFill>
                 <a:latin typeface="Consolas"/>
               </a:rPr>
-              <a:t>   </a:t>
+              <a:t>   </a:t>
+            </a:r>
+            <a:r>
+              <a:rPr lang="en-US" sz="1600" dirty="0" smtClean="0">
+                <a:solidFill>
+                  <a:srgbClr val="3C8203"/>
+                </a:solidFill>
+                <a:latin typeface="Consolas"/>
+              </a:rPr>
+              <a:t>nil</a:t>
+            </a:r>
+            <a:r>
+              <a:rPr lang="en-US" sz="1600" dirty="0" smtClean="0">
+                <a:solidFill>
+                  <a:srgbClr val="1C1C14"/>
+                </a:solidFill>
+                <a:latin typeface="Consolas"/>
+              </a:rPr>
+              <a:t> </a:t>
             </a:r>
           </a:p>
           <a:p>
             <a:pPr marL="0" indent="0">
               <a:buNone/>
             </a:pPr>
-            <a:endParaRPr lang="en-US" sz="1600" b="1" dirty="0" smtClean="0">
-              <a:solidFill>
-                <a:srgbClr val="5E1445"/>
-              </a:solidFill>
-              <a:latin typeface="Consolas-Bold"/>
-            </a:endParaRPr>
+            <a:r>
+              <a:rPr lang="en-US" sz="1600" b="1" dirty="0">
+                <a:solidFill>
+                  <a:srgbClr val="1C1C14"/>
+                </a:solidFill>
+                <a:latin typeface="Consolas"/>
+              </a:rPr>
+              <a:t> </a:t>
+            </a:r>
+            <a:r>
+              <a:rPr lang="en-US" sz="1600" b="1" dirty="0" smtClean="0">
+                <a:solidFill>
+                  <a:srgbClr val="1C1C14"/>
+                </a:solidFill>
+                <a:latin typeface="Consolas"/>
+              </a:rPr>
+              <a:t>   </a:t>
+            </a:r>
+            <a:r>
+              <a:rPr lang="en-US" sz="1600" b="1" dirty="0" smtClean="0">
+                <a:solidFill>
+                  <a:srgbClr val="5E1445"/>
+                </a:solidFill>
+                <a:latin typeface="Consolas-Bold"/>
+              </a:rPr>
+              <a:t>(</a:t>
+            </a:r>
+            <a:r>
+              <a:rPr lang="en-US" sz="1600" dirty="0">
+                <a:solidFill>
+                  <a:srgbClr val="515151"/>
+                </a:solidFill>
+                <a:latin typeface="Consolas"/>
+              </a:rPr>
+              <a:t>do</a:t>
+            </a:r>
+            <a:r>
+              <a:rPr lang="en-US" sz="1600" dirty="0">
+                <a:solidFill>
+                  <a:srgbClr val="1C1C14"/>
+                </a:solidFill>
+                <a:latin typeface="Consolas"/>
+              </a:rPr>
+              <a:t> </a:t>
+            </a:r>
+            <a:r>
+              <a:rPr lang="en-US" sz="1600" b="1" dirty="0">
+                <a:solidFill>
+                  <a:srgbClr val="5E1445"/>
+                </a:solidFill>
+                <a:latin typeface="Consolas-Bold"/>
+              </a:rPr>
+              <a:t>(</a:t>
+            </a:r>
+            <a:r>
+              <a:rPr lang="en-US" sz="1600" dirty="0" err="1">
+                <a:solidFill>
+                  <a:srgbClr val="E03186"/>
+                </a:solidFill>
+                <a:latin typeface="Consolas"/>
+              </a:rPr>
+              <a:t>println</a:t>
+            </a:r>
+            <a:r>
+              <a:rPr lang="en-US" sz="1600" dirty="0">
+                <a:solidFill>
+                  <a:srgbClr val="1C1C14"/>
+                </a:solidFill>
+                <a:latin typeface="Consolas"/>
+              </a:rPr>
+              <a:t> </a:t>
+            </a:r>
+            <a:r>
+              <a:rPr lang="en-US" sz="1600" dirty="0">
+                <a:solidFill>
+                  <a:srgbClr val="0029FA"/>
+                </a:solidFill>
+                <a:latin typeface="Consolas"/>
+              </a:rPr>
+              <a:t>"x is non-</a:t>
+            </a:r>
+            <a:r>
+              <a:rPr lang="en-US" sz="1600" dirty="0" err="1">
+                <a:solidFill>
+                  <a:srgbClr val="0029FA"/>
+                </a:solidFill>
+                <a:latin typeface="Consolas"/>
+              </a:rPr>
+              <a:t>neg</a:t>
+            </a:r>
+            <a:r>
+              <a:rPr lang="en-US" sz="1600" dirty="0">
+                <a:solidFill>
+                  <a:srgbClr val="0029FA"/>
+                </a:solidFill>
+                <a:latin typeface="Consolas"/>
+              </a:rPr>
+              <a:t>"</a:t>
+            </a:r>
+            <a:r>
+              <a:rPr lang="en-US" sz="1600" b="1" dirty="0">
+                <a:solidFill>
+                  <a:srgbClr val="5E1445"/>
+                </a:solidFill>
+                <a:latin typeface="Consolas-Bold"/>
+              </a:rPr>
+              <a:t>))</a:t>
+            </a:r>
+            <a:r>
+              <a:rPr lang="en-US" sz="1600" b="1" dirty="0" smtClean="0">
+                <a:solidFill>
+                  <a:srgbClr val="5E1445"/>
+                </a:solidFill>
+                <a:latin typeface="Consolas-Bold"/>
+              </a:rPr>
+              <a:t>)</a:t>
+            </a:r>
+            <a:r>
+              <a:rPr lang="en-US" sz="1600" dirty="0" smtClean="0">
+                <a:solidFill>
+                  <a:srgbClr val="1C1C14"/>
+                </a:solidFill>
+                <a:latin typeface="Consolas"/>
+              </a:rPr>
+              <a:t>  </a:t>
+            </a:r>
           </a:p>
           <a:p>
             <a:pPr marL="0" indent="0">
@@ -36959,12 +36967,12 @@
   <p:clrMapOvr>
     <a:masterClrMapping/>
   </p:clrMapOvr>
-  <mc:AlternateContent xmlns:mc="http://schemas.openxmlformats.org/markup-compatibility/2006" xmlns:p14="http://schemas.microsoft.com/office/powerpoint/2010/main">
-    <mc:Choice Requires="p14">
-      <p:transition spd="slow" p14:dur="2000" advTm="41788"/>
+  <mc:AlternateContent xmlns:mc="http://schemas.openxmlformats.org/markup-compatibility/2006">
+    <mc:Choice xmlns:p14="http://schemas.microsoft.com/office/powerpoint/2010/main" Requires="p14">
+      <p:transition spd="slow" p14:dur="2000" advTm="152275"/>
     </mc:Choice>
-    <mc:Fallback xmlns="">
-      <p:transition xmlns:p14="http://schemas.microsoft.com/office/powerpoint/2010/main" spd="slow" advTm="41788"/>
+    <mc:Fallback>
+      <p:transition xmlns:p14="http://schemas.microsoft.com/office/powerpoint/2010/main" spd="slow" advTm="152275"/>
     </mc:Fallback>
   </mc:AlternateContent>
   <p:timing>
@@ -37046,6 +37054,21 @@
   <p:clrMapOvr>
     <a:masterClrMapping/>
   </p:clrMapOvr>
+  <mc:AlternateContent xmlns:mc="http://schemas.openxmlformats.org/markup-compatibility/2006">
+    <mc:Choice xmlns:p14="http://schemas.microsoft.com/office/powerpoint/2010/main" Requires="p14">
+      <p:transition spd="slow" p14:dur="2000" advTm="6845"/>
+    </mc:Choice>
+    <mc:Fallback>
+      <p:transition xmlns:p14="http://schemas.microsoft.com/office/powerpoint/2010/main" spd="slow" advTm="6845"/>
+    </mc:Fallback>
+  </mc:AlternateContent>
+  <p:timing>
+    <p:tnLst>
+      <p:par>
+        <p:cTn xmlns:p14="http://schemas.microsoft.com/office/powerpoint/2010/main" id="1" dur="indefinite" restart="never" nodeType="tmRoot"/>
+      </p:par>
+    </p:tnLst>
+  </p:timing>
 </p:sld>
 </file>
 
@@ -37576,6 +37599,21 @@
   <p:clrMapOvr>
     <a:masterClrMapping/>
   </p:clrMapOvr>
+  <mc:AlternateContent xmlns:mc="http://schemas.openxmlformats.org/markup-compatibility/2006">
+    <mc:Choice xmlns:p14="http://schemas.microsoft.com/office/powerpoint/2010/main" Requires="p14">
+      <p:transition spd="slow" p14:dur="2000" advTm="72331"/>
+    </mc:Choice>
+    <mc:Fallback>
+      <p:transition xmlns:p14="http://schemas.microsoft.com/office/powerpoint/2010/main" spd="slow" advTm="72331"/>
+    </mc:Fallback>
+  </mc:AlternateContent>
+  <p:timing>
+    <p:tnLst>
+      <p:par>
+        <p:cTn xmlns:p14="http://schemas.microsoft.com/office/powerpoint/2010/main" id="1" dur="indefinite" restart="never" nodeType="tmRoot"/>
+      </p:par>
+    </p:tnLst>
+  </p:timing>
 </p:sld>
 </file>
 
@@ -38742,6 +38780,21 @@
   <p:clrMapOvr>
     <a:masterClrMapping/>
   </p:clrMapOvr>
+  <mc:AlternateContent xmlns:mc="http://schemas.openxmlformats.org/markup-compatibility/2006">
+    <mc:Choice xmlns:p14="http://schemas.microsoft.com/office/powerpoint/2010/main" Requires="p14">
+      <p:transition spd="slow" p14:dur="2000" advTm="95949"/>
+    </mc:Choice>
+    <mc:Fallback>
+      <p:transition xmlns:p14="http://schemas.microsoft.com/office/powerpoint/2010/main" spd="slow" advTm="95949"/>
+    </mc:Fallback>
+  </mc:AlternateContent>
+  <p:timing>
+    <p:tnLst>
+      <p:par>
+        <p:cTn xmlns:p14="http://schemas.microsoft.com/office/powerpoint/2010/main" id="1" dur="indefinite" restart="never" nodeType="tmRoot"/>
+      </p:par>
+    </p:tnLst>
+  </p:timing>
 </p:sld>
 </file>
 
@@ -40470,6 +40523,21 @@
   <p:clrMapOvr>
     <a:masterClrMapping/>
   </p:clrMapOvr>
+  <mc:AlternateContent xmlns:mc="http://schemas.openxmlformats.org/markup-compatibility/2006">
+    <mc:Choice xmlns:p14="http://schemas.microsoft.com/office/powerpoint/2010/main" Requires="p14">
+      <p:transition spd="slow" p14:dur="2000" advTm="113332"/>
+    </mc:Choice>
+    <mc:Fallback>
+      <p:transition xmlns:p14="http://schemas.microsoft.com/office/powerpoint/2010/main" spd="slow" advTm="113332"/>
+    </mc:Fallback>
+  </mc:AlternateContent>
+  <p:timing>
+    <p:tnLst>
+      <p:par>
+        <p:cTn xmlns:p14="http://schemas.microsoft.com/office/powerpoint/2010/main" id="1" dur="indefinite" restart="never" nodeType="tmRoot"/>
+      </p:par>
+    </p:tnLst>
+  </p:timing>
 </p:sld>
 </file>
 
@@ -40542,12 +40610,12 @@
   <p:clrMapOvr>
     <a:masterClrMapping/>
   </p:clrMapOvr>
-  <mc:AlternateContent xmlns:mc="http://schemas.openxmlformats.org/markup-compatibility/2006" xmlns:p14="http://schemas.microsoft.com/office/powerpoint/2010/main">
-    <mc:Choice Requires="p14">
-      <p:transition spd="slow" p14:dur="2000" advTm="5072"/>
+  <mc:AlternateContent xmlns:mc="http://schemas.openxmlformats.org/markup-compatibility/2006">
+    <mc:Choice xmlns:p14="http://schemas.microsoft.com/office/powerpoint/2010/main" Requires="p14">
+      <p:transition spd="slow" p14:dur="2000" advTm="578"/>
     </mc:Choice>
-    <mc:Fallback xmlns="">
-      <p:transition xmlns:p14="http://schemas.microsoft.com/office/powerpoint/2010/main" spd="slow" advTm="5072"/>
+    <mc:Fallback>
+      <p:transition xmlns:p14="http://schemas.microsoft.com/office/powerpoint/2010/main" spd="slow" advTm="578"/>
     </mc:Fallback>
   </mc:AlternateContent>
   <p:timing>
@@ -41128,12 +41196,12 @@
   <p:clrMapOvr>
     <a:masterClrMapping/>
   </p:clrMapOvr>
-  <mc:AlternateContent xmlns:mc="http://schemas.openxmlformats.org/markup-compatibility/2006" xmlns:p14="http://schemas.microsoft.com/office/powerpoint/2010/main">
-    <mc:Choice Requires="p14">
-      <p:transition spd="slow" p14:dur="2000" advTm="235916"/>
+  <mc:AlternateContent xmlns:mc="http://schemas.openxmlformats.org/markup-compatibility/2006">
+    <mc:Choice xmlns:p14="http://schemas.microsoft.com/office/powerpoint/2010/main" Requires="p14">
+      <p:transition spd="slow" p14:dur="2000" advTm="6008"/>
     </mc:Choice>
-    <mc:Fallback xmlns="">
-      <p:transition xmlns:p14="http://schemas.microsoft.com/office/powerpoint/2010/main" spd="slow" advTm="235916"/>
+    <mc:Fallback>
+      <p:transition xmlns:p14="http://schemas.microsoft.com/office/powerpoint/2010/main" spd="slow" advTm="6008"/>
     </mc:Fallback>
   </mc:AlternateContent>
   <p:timing>
@@ -41354,12 +41422,12 @@
   <p:clrMapOvr>
     <a:masterClrMapping/>
   </p:clrMapOvr>
-  <mc:AlternateContent xmlns:mc="http://schemas.openxmlformats.org/markup-compatibility/2006" xmlns:p14="http://schemas.microsoft.com/office/powerpoint/2010/main">
-    <mc:Choice Requires="p14">
-      <p:transition spd="slow" p14:dur="2000" advTm="341961"/>
+  <mc:AlternateContent xmlns:mc="http://schemas.openxmlformats.org/markup-compatibility/2006">
+    <mc:Choice xmlns:p14="http://schemas.microsoft.com/office/powerpoint/2010/main" Requires="p14">
+      <p:transition spd="slow" p14:dur="2000" advTm="130816"/>
     </mc:Choice>
-    <mc:Fallback xmlns="">
-      <p:transition xmlns:p14="http://schemas.microsoft.com/office/powerpoint/2010/main" spd="slow" advTm="341961"/>
+    <mc:Fallback>
+      <p:transition xmlns:p14="http://schemas.microsoft.com/office/powerpoint/2010/main" spd="slow" advTm="130816"/>
     </mc:Fallback>
   </mc:AlternateContent>
   <p:timing>
@@ -41570,9 +41638,45 @@
               <a:buNone/>
             </a:pPr>
             <a:r>
+              <a:rPr lang="en-US" u="sng" dirty="0"/>
+              <a:t>Online </a:t>
+            </a:r>
+            <a:r>
+              <a:rPr lang="en-US" u="sng" dirty="0" smtClean="0"/>
+              <a:t>REPL</a:t>
+            </a:r>
+            <a:r>
+              <a:rPr lang="en-US" dirty="0" smtClean="0"/>
+              <a:t/>
+            </a:r>
+            <a:br>
+              <a:rPr lang="en-US" dirty="0" smtClean="0"/>
+            </a:br>
+            <a:r>
+              <a:rPr lang="en-US" dirty="0" smtClean="0"/>
+              <a:t>  </a:t>
+            </a:r>
+            <a:r>
+              <a:rPr lang="en-US" i="1" dirty="0" err="1" smtClean="0"/>
+              <a:t>www.tryclj.com</a:t>
+            </a:r>
+            <a:endParaRPr lang="en-US" i="1" dirty="0"/>
+          </a:p>
+          <a:p>
+            <a:pPr marL="0" indent="0">
+              <a:buNone/>
+            </a:pPr>
+            <a:endParaRPr lang="en-US" u="sng" dirty="0" smtClean="0"/>
+          </a:p>
+          <a:p>
+            <a:pPr marL="0" indent="0">
+              <a:buNone/>
+            </a:pPr>
+            <a:r>
               <a:rPr lang="en-US" u="sng" dirty="0" smtClean="0"/>
               <a:t>Tools</a:t>
             </a:r>
+            <a:endParaRPr lang="en-US" u="sng" dirty="0" smtClean="0"/>
           </a:p>
           <a:p>
             <a:r>
@@ -41591,16 +41695,9 @@
             </a:r>
           </a:p>
           <a:p>
-            <a:r>
-              <a:rPr lang="en-US" dirty="0" err="1" smtClean="0"/>
-              <a:t>Midje</a:t>
-            </a:r>
-            <a:r>
-              <a:rPr lang="en-US" dirty="0" smtClean="0"/>
-              <a:t> (testing)</a:t>
-            </a:r>
-          </a:p>
-          <a:p>
+            <a:pPr marL="0" indent="0">
+              <a:buNone/>
+            </a:pPr>
             <a:endParaRPr lang="en-US" dirty="0" smtClean="0"/>
           </a:p>
           <a:p>
@@ -41612,17 +41709,6 @@
           </a:p>
           <a:p>
             <a:endParaRPr lang="en-US" dirty="0" smtClean="0"/>
-          </a:p>
-          <a:p>
-            <a:r>
-              <a:rPr lang="en-US" dirty="0" smtClean="0"/>
-              <a:t>Online REPL: </a:t>
-            </a:r>
-            <a:r>
-              <a:rPr lang="en-US" dirty="0" err="1" smtClean="0"/>
-              <a:t>www.tryclj.org</a:t>
-            </a:r>
-            <a:endParaRPr lang="en-US" dirty="0"/>
           </a:p>
         </p:txBody>
       </p:sp>
@@ -41636,12 +41722,12 @@
   <p:clrMapOvr>
     <a:masterClrMapping/>
   </p:clrMapOvr>
-  <mc:AlternateContent xmlns:mc="http://schemas.openxmlformats.org/markup-compatibility/2006" xmlns:p14="http://schemas.microsoft.com/office/powerpoint/2010/main">
-    <mc:Choice Requires="p14">
-      <p:transition spd="slow" p14:dur="2000" advTm="19543"/>
+  <mc:AlternateContent xmlns:mc="http://schemas.openxmlformats.org/markup-compatibility/2006">
+    <mc:Choice xmlns:p14="http://schemas.microsoft.com/office/powerpoint/2010/main" Requires="p14">
+      <p:transition spd="slow" p14:dur="2000" advTm="27679"/>
     </mc:Choice>
-    <mc:Fallback xmlns="">
-      <p:transition xmlns:p14="http://schemas.microsoft.com/office/powerpoint/2010/main" spd="slow" advTm="19543"/>
+    <mc:Fallback>
+      <p:transition xmlns:p14="http://schemas.microsoft.com/office/powerpoint/2010/main" spd="slow" advTm="27679"/>
     </mc:Fallback>
   </mc:AlternateContent>
   <p:timing>
@@ -41747,17 +41833,25 @@
             </a:pPr>
             <a:r>
               <a:rPr lang="en-US" sz="2000" dirty="0" err="1" smtClean="0"/>
-              <a:t>martin@mjul.com</a:t>
-            </a:r>
-            <a:endParaRPr lang="en-US" sz="2000" dirty="0"/>
+              <a:t>martin@</a:t>
+            </a:r>
+            <a:r>
+              <a:rPr lang="en-US" sz="2000" dirty="0" err="1" smtClean="0"/>
+              <a:t>mjul.com</a:t>
+            </a:r>
+            <a:endParaRPr lang="en-US" sz="2000" dirty="0" smtClean="0"/>
           </a:p>
           <a:p>
             <a:pPr marL="0" indent="0">
               <a:buNone/>
             </a:pPr>
             <a:r>
+              <a:rPr lang="en-US" sz="2000" dirty="0" smtClean="0"/>
+              <a:t>Twitter</a:t>
+            </a:r>
+            <a:r>
               <a:rPr lang="en-US" sz="2000" dirty="0"/>
-              <a:t>Twitter: @</a:t>
+              <a:t>: @</a:t>
             </a:r>
             <a:r>
               <a:rPr lang="en-US" sz="2000" dirty="0" err="1"/>
@@ -42118,12 +42212,12 @@
   <p:clrMapOvr>
     <a:masterClrMapping/>
   </p:clrMapOvr>
-  <mc:AlternateContent xmlns:mc="http://schemas.openxmlformats.org/markup-compatibility/2006" xmlns:p14="http://schemas.microsoft.com/office/powerpoint/2010/main">
-    <mc:Choice Requires="p14">
-      <p:transition spd="slow" p14:dur="2000" advTm="48730"/>
+  <mc:AlternateContent xmlns:mc="http://schemas.openxmlformats.org/markup-compatibility/2006">
+    <mc:Choice xmlns:p14="http://schemas.microsoft.com/office/powerpoint/2010/main" Requires="p14">
+      <p:transition spd="slow" p14:dur="2000" advTm="27541"/>
     </mc:Choice>
-    <mc:Fallback xmlns="">
-      <p:transition xmlns:p14="http://schemas.microsoft.com/office/powerpoint/2010/main" spd="slow" advTm="48730"/>
+    <mc:Fallback>
+      <p:transition xmlns:p14="http://schemas.microsoft.com/office/powerpoint/2010/main" spd="slow" advTm="27541"/>
     </mc:Fallback>
   </mc:AlternateContent>
   <p:timing>
@@ -43184,12 +43278,12 @@
   <p:clrMapOvr>
     <a:masterClrMapping/>
   </p:clrMapOvr>
-  <mc:AlternateContent xmlns:mc="http://schemas.openxmlformats.org/markup-compatibility/2006" xmlns:p14="http://schemas.microsoft.com/office/powerpoint/2010/main">
-    <mc:Choice Requires="p14">
-      <p:transition spd="slow" p14:dur="2000" advTm="66225"/>
+  <mc:AlternateContent xmlns:mc="http://schemas.openxmlformats.org/markup-compatibility/2006">
+    <mc:Choice xmlns:p14="http://schemas.microsoft.com/office/powerpoint/2010/main" Requires="p14">
+      <p:transition spd="slow" p14:dur="2000" advTm="40547"/>
     </mc:Choice>
-    <mc:Fallback xmlns="">
-      <p:transition xmlns:p14="http://schemas.microsoft.com/office/powerpoint/2010/main" spd="slow" advTm="66225"/>
+    <mc:Fallback>
+      <p:transition xmlns:p14="http://schemas.microsoft.com/office/powerpoint/2010/main" spd="slow" advTm="40547"/>
     </mc:Fallback>
   </mc:AlternateContent>
   <p:timing>
@@ -44334,12 +44428,12 @@
   <p:clrMapOvr>
     <a:masterClrMapping/>
   </p:clrMapOvr>
-  <mc:AlternateContent xmlns:mc="http://schemas.openxmlformats.org/markup-compatibility/2006" xmlns:p14="http://schemas.microsoft.com/office/powerpoint/2010/main">
-    <mc:Choice Requires="p14">
-      <p:transition spd="slow" p14:dur="2000" advTm="108479"/>
+  <mc:AlternateContent xmlns:mc="http://schemas.openxmlformats.org/markup-compatibility/2006">
+    <mc:Choice xmlns:p14="http://schemas.microsoft.com/office/powerpoint/2010/main" Requires="p14">
+      <p:transition spd="slow" p14:dur="2000" advTm="111253"/>
     </mc:Choice>
-    <mc:Fallback xmlns="">
-      <p:transition xmlns:p14="http://schemas.microsoft.com/office/powerpoint/2010/main" spd="slow" advTm="108479"/>
+    <mc:Fallback>
+      <p:transition xmlns:p14="http://schemas.microsoft.com/office/powerpoint/2010/main" spd="slow" advTm="111253"/>
     </mc:Fallback>
   </mc:AlternateContent>
   <p:timing>
@@ -45938,12 +46032,12 @@
   <p:clrMapOvr>
     <a:masterClrMapping/>
   </p:clrMapOvr>
-  <mc:AlternateContent xmlns:mc="http://schemas.openxmlformats.org/markup-compatibility/2006" xmlns:p14="http://schemas.microsoft.com/office/powerpoint/2010/main">
-    <mc:Choice Requires="p14">
-      <p:transition spd="slow" p14:dur="2000" advTm="32828"/>
+  <mc:AlternateContent xmlns:mc="http://schemas.openxmlformats.org/markup-compatibility/2006">
+    <mc:Choice xmlns:p14="http://schemas.microsoft.com/office/powerpoint/2010/main" Requires="p14">
+      <p:transition spd="slow" p14:dur="2000" advTm="91227"/>
     </mc:Choice>
-    <mc:Fallback xmlns="">
-      <p:transition xmlns:p14="http://schemas.microsoft.com/office/powerpoint/2010/main" spd="slow" advTm="32828"/>
+    <mc:Fallback>
+      <p:transition xmlns:p14="http://schemas.microsoft.com/office/powerpoint/2010/main" spd="slow" advTm="91227"/>
     </mc:Fallback>
   </mc:AlternateContent>
   <p:timing>
@@ -46364,12 +46458,12 @@
   <p:clrMapOvr>
     <a:masterClrMapping/>
   </p:clrMapOvr>
-  <mc:AlternateContent xmlns:mc="http://schemas.openxmlformats.org/markup-compatibility/2006" xmlns:p14="http://schemas.microsoft.com/office/powerpoint/2010/main">
-    <mc:Choice Requires="p14">
-      <p:transition spd="slow" p14:dur="2000" advTm="47468"/>
+  <mc:AlternateContent xmlns:mc="http://schemas.openxmlformats.org/markup-compatibility/2006">
+    <mc:Choice xmlns:p14="http://schemas.microsoft.com/office/powerpoint/2010/main" Requires="p14">
+      <p:transition spd="slow" p14:dur="2000" advTm="105248"/>
     </mc:Choice>
-    <mc:Fallback xmlns="">
-      <p:transition xmlns:p14="http://schemas.microsoft.com/office/powerpoint/2010/main" spd="slow" advTm="47468"/>
+    <mc:Fallback>
+      <p:transition xmlns:p14="http://schemas.microsoft.com/office/powerpoint/2010/main" spd="slow" advTm="105248"/>
     </mc:Fallback>
   </mc:AlternateContent>
   <p:timing>
@@ -46451,12 +46545,12 @@
   <p:clrMapOvr>
     <a:masterClrMapping/>
   </p:clrMapOvr>
-  <mc:AlternateContent xmlns:mc="http://schemas.openxmlformats.org/markup-compatibility/2006" xmlns:p14="http://schemas.microsoft.com/office/powerpoint/2010/main">
-    <mc:Choice Requires="p14">
-      <p:transition spd="slow" p14:dur="2000" advTm="2502"/>
+  <mc:AlternateContent xmlns:mc="http://schemas.openxmlformats.org/markup-compatibility/2006">
+    <mc:Choice xmlns:p14="http://schemas.microsoft.com/office/powerpoint/2010/main" Requires="p14">
+      <p:transition spd="slow" p14:dur="2000" advTm="7922"/>
     </mc:Choice>
-    <mc:Fallback xmlns="">
-      <p:transition xmlns:p14="http://schemas.microsoft.com/office/powerpoint/2010/main" spd="slow" advTm="2502"/>
+    <mc:Fallback>
+      <p:transition xmlns:p14="http://schemas.microsoft.com/office/powerpoint/2010/main" spd="slow" advTm="7922"/>
     </mc:Fallback>
   </mc:AlternateContent>
   <p:timing>

</xml_diff>